<commit_message>
Updated presentation and adding presentation notes.
</commit_message>
<xml_diff>
--- a/1-Intro/Session1-Shah.pptx
+++ b/1-Intro/Session1-Shah.pptx
@@ -5,7 +5,7 @@
     <p:sldMasterId id="2147483648" r:id="rId1"/>
   </p:sldMasterIdLst>
   <p:notesMasterIdLst>
-    <p:notesMasterId r:id="rId12"/>
+    <p:notesMasterId r:id="rId18"/>
   </p:notesMasterIdLst>
   <p:sldIdLst>
     <p:sldId id="256" r:id="rId2"/>
@@ -18,6 +18,12 @@
     <p:sldId id="263" r:id="rId9"/>
     <p:sldId id="264" r:id="rId10"/>
     <p:sldId id="265" r:id="rId11"/>
+    <p:sldId id="272" r:id="rId12"/>
+    <p:sldId id="273" r:id="rId13"/>
+    <p:sldId id="274" r:id="rId14"/>
+    <p:sldId id="275" r:id="rId15"/>
+    <p:sldId id="276" r:id="rId16"/>
+    <p:sldId id="271" r:id="rId17"/>
   </p:sldIdLst>
   <p:sldSz cx="9144000" cy="6858000" type="screen4x3"/>
   <p:notesSz cx="6858000" cy="9144000"/>
@@ -201,7 +207,7 @@
           <a:p>
             <a:fld id="{D8D6174A-72AC-DE48-B3D6-6AE76057A7D4}" type="datetimeFigureOut">
               <a:rPr lang="en-US" smtClean="0"/>
-              <a:t>12-09-05</a:t>
+              <a:t>12-09-11</a:t>
             </a:fld>
             <a:endParaRPr lang="en-US"/>
           </a:p>
@@ -734,7 +740,7 @@
           <a:p>
             <a:fld id="{D9224675-A818-BD4E-AFD7-105110411CE3}" type="datetimeFigureOut">
               <a:rPr lang="en-US" smtClean="0"/>
-              <a:t>12-09-05</a:t>
+              <a:t>12-09-11</a:t>
             </a:fld>
             <a:endParaRPr lang="en-US"/>
           </a:p>
@@ -904,7 +910,7 @@
           <a:p>
             <a:fld id="{D9224675-A818-BD4E-AFD7-105110411CE3}" type="datetimeFigureOut">
               <a:rPr lang="en-US" smtClean="0"/>
-              <a:t>12-09-05</a:t>
+              <a:t>12-09-11</a:t>
             </a:fld>
             <a:endParaRPr lang="en-US"/>
           </a:p>
@@ -1084,7 +1090,7 @@
           <a:p>
             <a:fld id="{D9224675-A818-BD4E-AFD7-105110411CE3}" type="datetimeFigureOut">
               <a:rPr lang="en-US" smtClean="0"/>
-              <a:t>12-09-05</a:t>
+              <a:t>12-09-11</a:t>
             </a:fld>
             <a:endParaRPr lang="en-US"/>
           </a:p>
@@ -1254,7 +1260,7 @@
           <a:p>
             <a:fld id="{D9224675-A818-BD4E-AFD7-105110411CE3}" type="datetimeFigureOut">
               <a:rPr lang="en-US" smtClean="0"/>
-              <a:t>12-09-05</a:t>
+              <a:t>12-09-11</a:t>
             </a:fld>
             <a:endParaRPr lang="en-US"/>
           </a:p>
@@ -1500,7 +1506,7 @@
           <a:p>
             <a:fld id="{D9224675-A818-BD4E-AFD7-105110411CE3}" type="datetimeFigureOut">
               <a:rPr lang="en-US" smtClean="0"/>
-              <a:t>12-09-05</a:t>
+              <a:t>12-09-11</a:t>
             </a:fld>
             <a:endParaRPr lang="en-US"/>
           </a:p>
@@ -1788,7 +1794,7 @@
           <a:p>
             <a:fld id="{D9224675-A818-BD4E-AFD7-105110411CE3}" type="datetimeFigureOut">
               <a:rPr lang="en-US" smtClean="0"/>
-              <a:t>12-09-05</a:t>
+              <a:t>12-09-11</a:t>
             </a:fld>
             <a:endParaRPr lang="en-US"/>
           </a:p>
@@ -2210,7 +2216,7 @@
           <a:p>
             <a:fld id="{D9224675-A818-BD4E-AFD7-105110411CE3}" type="datetimeFigureOut">
               <a:rPr lang="en-US" smtClean="0"/>
-              <a:t>12-09-05</a:t>
+              <a:t>12-09-11</a:t>
             </a:fld>
             <a:endParaRPr lang="en-US"/>
           </a:p>
@@ -2328,7 +2334,7 @@
           <a:p>
             <a:fld id="{D9224675-A818-BD4E-AFD7-105110411CE3}" type="datetimeFigureOut">
               <a:rPr lang="en-US" smtClean="0"/>
-              <a:t>12-09-05</a:t>
+              <a:t>12-09-11</a:t>
             </a:fld>
             <a:endParaRPr lang="en-US"/>
           </a:p>
@@ -2423,7 +2429,7 @@
           <a:p>
             <a:fld id="{D9224675-A818-BD4E-AFD7-105110411CE3}" type="datetimeFigureOut">
               <a:rPr lang="en-US" smtClean="0"/>
-              <a:t>12-09-05</a:t>
+              <a:t>12-09-11</a:t>
             </a:fld>
             <a:endParaRPr lang="en-US"/>
           </a:p>
@@ -2700,7 +2706,7 @@
           <a:p>
             <a:fld id="{D9224675-A818-BD4E-AFD7-105110411CE3}" type="datetimeFigureOut">
               <a:rPr lang="en-US" smtClean="0"/>
-              <a:t>12-09-05</a:t>
+              <a:t>12-09-11</a:t>
             </a:fld>
             <a:endParaRPr lang="en-US"/>
           </a:p>
@@ -2953,7 +2959,7 @@
           <a:p>
             <a:fld id="{D9224675-A818-BD4E-AFD7-105110411CE3}" type="datetimeFigureOut">
               <a:rPr lang="en-US" smtClean="0"/>
-              <a:t>12-09-05</a:t>
+              <a:t>12-09-11</a:t>
             </a:fld>
             <a:endParaRPr lang="en-US"/>
           </a:p>
@@ -3166,7 +3172,7 @@
           <a:p>
             <a:fld id="{D9224675-A818-BD4E-AFD7-105110411CE3}" type="datetimeFigureOut">
               <a:rPr lang="en-US" smtClean="0"/>
-              <a:t>12-09-05</a:t>
+              <a:t>12-09-11</a:t>
             </a:fld>
             <a:endParaRPr lang="en-US"/>
           </a:p>
@@ -3611,7 +3617,11 @@
           <a:p>
             <a:r>
               <a:rPr lang="en-US" dirty="0" smtClean="0"/>
-              <a:t>Shahjahan Warraich</a:t>
+              <a:t>Shah </a:t>
+            </a:r>
+            <a:r>
+              <a:rPr lang="en-US" dirty="0" smtClean="0"/>
+              <a:t>Warraich</a:t>
             </a:r>
             <a:endParaRPr lang="en-US" dirty="0"/>
           </a:p>
@@ -3819,6 +3829,848 @@
 </p:sld>
 </file>
 
+<file path=ppt/slides/slide11.xml><?xml version="1.0" encoding="utf-8"?>
+<p:sld xmlns:a="http://schemas.openxmlformats.org/drawingml/2006/main" xmlns:r="http://schemas.openxmlformats.org/officeDocument/2006/relationships" xmlns:p="http://schemas.openxmlformats.org/presentationml/2006/main">
+  <p:cSld>
+    <p:spTree>
+      <p:nvGrpSpPr>
+        <p:cNvPr id="1" name=""/>
+        <p:cNvGrpSpPr/>
+        <p:nvPr/>
+      </p:nvGrpSpPr>
+      <p:grpSpPr>
+        <a:xfrm>
+          <a:off x="0" y="0"/>
+          <a:ext cx="0" cy="0"/>
+          <a:chOff x="0" y="0"/>
+          <a:chExt cx="0" cy="0"/>
+        </a:xfrm>
+      </p:grpSpPr>
+      <p:sp>
+        <p:nvSpPr>
+          <p:cNvPr id="2" name="Title 1"/>
+          <p:cNvSpPr>
+            <a:spLocks noGrp="1"/>
+          </p:cNvSpPr>
+          <p:nvPr>
+            <p:ph type="title"/>
+          </p:nvPr>
+        </p:nvSpPr>
+        <p:spPr/>
+        <p:txBody>
+          <a:bodyPr/>
+          <a:lstStyle/>
+          <a:p>
+            <a:r>
+              <a:rPr lang="en-US" dirty="0" smtClean="0"/>
+              <a:t>A comparative study</a:t>
+            </a:r>
+            <a:endParaRPr lang="en-US" dirty="0"/>
+          </a:p>
+        </p:txBody>
+      </p:sp>
+      <p:sp>
+        <p:nvSpPr>
+          <p:cNvPr id="3" name="Content Placeholder 2"/>
+          <p:cNvSpPr>
+            <a:spLocks noGrp="1"/>
+          </p:cNvSpPr>
+          <p:nvPr>
+            <p:ph idx="1"/>
+          </p:nvPr>
+        </p:nvSpPr>
+        <p:spPr>
+          <a:xfrm>
+            <a:off x="457200" y="1465808"/>
+            <a:ext cx="8432404" cy="4525963"/>
+          </a:xfrm>
+        </p:spPr>
+        <p:txBody>
+          <a:bodyPr/>
+          <a:lstStyle/>
+          <a:p>
+            <a:pPr marL="0" indent="0" algn="ctr">
+              <a:buNone/>
+            </a:pPr>
+            <a:r>
+              <a:rPr lang="en-US" dirty="0" smtClean="0"/>
+              <a:t>Python </a:t>
+            </a:r>
+            <a:r>
+              <a:rPr lang="en-US" dirty="0" err="1" smtClean="0"/>
+              <a:t>vs</a:t>
+            </a:r>
+            <a:r>
+              <a:rPr lang="en-US" dirty="0" smtClean="0"/>
+              <a:t> Non-scripting languages (Java, C#, C++)</a:t>
+            </a:r>
+          </a:p>
+          <a:p>
+            <a:pPr marL="0" indent="0" algn="ctr">
+              <a:buNone/>
+            </a:pPr>
+            <a:endParaRPr lang="en-US" dirty="0" smtClean="0"/>
+          </a:p>
+          <a:p>
+            <a:pPr lvl="1"/>
+            <a:r>
+              <a:rPr lang="en-US" dirty="0" smtClean="0"/>
+              <a:t>Python will generally run slower</a:t>
+            </a:r>
+          </a:p>
+          <a:p>
+            <a:pPr lvl="1"/>
+            <a:r>
+              <a:rPr lang="en-US" dirty="0" smtClean="0"/>
+              <a:t>Much quicker to build</a:t>
+            </a:r>
+          </a:p>
+          <a:p>
+            <a:pPr lvl="1"/>
+            <a:r>
+              <a:rPr lang="en-US" dirty="0" smtClean="0"/>
+              <a:t>Python can be a ‘glue’ language. Develop components in java; combine them using python.</a:t>
+            </a:r>
+          </a:p>
+          <a:p>
+            <a:pPr lvl="1"/>
+            <a:r>
+              <a:rPr lang="en-US" dirty="0" smtClean="0"/>
+              <a:t>Can build binaries.</a:t>
+            </a:r>
+          </a:p>
+        </p:txBody>
+      </p:sp>
+    </p:spTree>
+    <p:extLst>
+      <p:ext uri="{BB962C8B-B14F-4D97-AF65-F5344CB8AC3E}">
+        <p14:creationId xmlns:p14="http://schemas.microsoft.com/office/powerpoint/2010/main" val="4174061995"/>
+      </p:ext>
+    </p:extLst>
+  </p:cSld>
+  <p:clrMapOvr>
+    <a:masterClrMapping/>
+  </p:clrMapOvr>
+</p:sld>
+</file>
+
+<file path=ppt/slides/slide12.xml><?xml version="1.0" encoding="utf-8"?>
+<p:sld xmlns:a="http://schemas.openxmlformats.org/drawingml/2006/main" xmlns:r="http://schemas.openxmlformats.org/officeDocument/2006/relationships" xmlns:p="http://schemas.openxmlformats.org/presentationml/2006/main">
+  <p:cSld>
+    <p:spTree>
+      <p:nvGrpSpPr>
+        <p:cNvPr id="1" name=""/>
+        <p:cNvGrpSpPr/>
+        <p:nvPr/>
+      </p:nvGrpSpPr>
+      <p:grpSpPr>
+        <a:xfrm>
+          <a:off x="0" y="0"/>
+          <a:ext cx="0" cy="0"/>
+          <a:chOff x="0" y="0"/>
+          <a:chExt cx="0" cy="0"/>
+        </a:xfrm>
+      </p:grpSpPr>
+      <p:sp>
+        <p:nvSpPr>
+          <p:cNvPr id="3" name="Content Placeholder 2"/>
+          <p:cNvSpPr>
+            <a:spLocks noGrp="1"/>
+          </p:cNvSpPr>
+          <p:nvPr>
+            <p:ph idx="1"/>
+          </p:nvPr>
+        </p:nvSpPr>
+        <p:spPr>
+          <a:xfrm>
+            <a:off x="457200" y="408692"/>
+            <a:ext cx="8229600" cy="5564993"/>
+          </a:xfrm>
+        </p:spPr>
+        <p:txBody>
+          <a:bodyPr>
+            <a:normAutofit lnSpcReduction="10000"/>
+          </a:bodyPr>
+          <a:lstStyle/>
+          <a:p>
+            <a:pPr marL="0" indent="0" algn="ctr">
+              <a:buNone/>
+            </a:pPr>
+            <a:r>
+              <a:rPr lang="en-US" dirty="0" smtClean="0"/>
+              <a:t>Python </a:t>
+            </a:r>
+            <a:r>
+              <a:rPr lang="en-US" dirty="0" err="1" smtClean="0"/>
+              <a:t>vs</a:t>
+            </a:r>
+            <a:r>
+              <a:rPr lang="en-US" dirty="0" smtClean="0"/>
+              <a:t> PHP</a:t>
+            </a:r>
+          </a:p>
+          <a:p>
+            <a:pPr marL="0" indent="0" algn="ctr">
+              <a:buNone/>
+            </a:pPr>
+            <a:endParaRPr lang="en-US" dirty="0" smtClean="0"/>
+          </a:p>
+          <a:p>
+            <a:r>
+              <a:rPr lang="en-US" dirty="0" smtClean="0"/>
+              <a:t>A world of commonalities</a:t>
+            </a:r>
+          </a:p>
+          <a:p>
+            <a:r>
+              <a:rPr lang="en-US" dirty="0" smtClean="0"/>
+              <a:t>PHP has</a:t>
+            </a:r>
+          </a:p>
+          <a:p>
+            <a:pPr lvl="1"/>
+            <a:r>
+              <a:rPr lang="en-US" dirty="0" smtClean="0"/>
+              <a:t>Curly braces</a:t>
+            </a:r>
+          </a:p>
+          <a:p>
+            <a:pPr lvl="1"/>
+            <a:r>
+              <a:rPr lang="en-US" dirty="0" smtClean="0"/>
+              <a:t>Built-in function library has a wide variety of naming conventions.</a:t>
+            </a:r>
+          </a:p>
+          <a:p>
+            <a:pPr lvl="1"/>
+            <a:r>
+              <a:rPr lang="en-US" dirty="0" smtClean="0"/>
+              <a:t>Weak type system</a:t>
+            </a:r>
+          </a:p>
+          <a:p>
+            <a:pPr lvl="1"/>
+            <a:r>
+              <a:rPr lang="en-US" dirty="0" smtClean="0"/>
+              <a:t>Dictionary keys are iterated in the same order</a:t>
+            </a:r>
+          </a:p>
+          <a:p>
+            <a:pPr lvl="1"/>
+            <a:r>
+              <a:rPr lang="en-US" dirty="0" smtClean="0"/>
+              <a:t>Interfaces</a:t>
+            </a:r>
+          </a:p>
+          <a:p>
+            <a:pPr lvl="1"/>
+            <a:r>
+              <a:rPr lang="en-US" dirty="0" smtClean="0"/>
+              <a:t>Embeddable in html</a:t>
+            </a:r>
+            <a:endParaRPr lang="en-US" dirty="0"/>
+          </a:p>
+        </p:txBody>
+      </p:sp>
+    </p:spTree>
+    <p:extLst>
+      <p:ext uri="{BB962C8B-B14F-4D97-AF65-F5344CB8AC3E}">
+        <p14:creationId xmlns:p14="http://schemas.microsoft.com/office/powerpoint/2010/main" val="2973278141"/>
+      </p:ext>
+    </p:extLst>
+  </p:cSld>
+  <p:clrMapOvr>
+    <a:masterClrMapping/>
+  </p:clrMapOvr>
+</p:sld>
+</file>
+
+<file path=ppt/slides/slide13.xml><?xml version="1.0" encoding="utf-8"?>
+<p:sld xmlns:a="http://schemas.openxmlformats.org/drawingml/2006/main" xmlns:r="http://schemas.openxmlformats.org/officeDocument/2006/relationships" xmlns:p="http://schemas.openxmlformats.org/presentationml/2006/main">
+  <p:cSld>
+    <p:spTree>
+      <p:nvGrpSpPr>
+        <p:cNvPr id="1" name=""/>
+        <p:cNvGrpSpPr/>
+        <p:nvPr/>
+      </p:nvGrpSpPr>
+      <p:grpSpPr>
+        <a:xfrm>
+          <a:off x="0" y="0"/>
+          <a:ext cx="0" cy="0"/>
+          <a:chOff x="0" y="0"/>
+          <a:chExt cx="0" cy="0"/>
+        </a:xfrm>
+      </p:grpSpPr>
+      <p:sp>
+        <p:nvSpPr>
+          <p:cNvPr id="3" name="Content Placeholder 2"/>
+          <p:cNvSpPr>
+            <a:spLocks noGrp="1"/>
+          </p:cNvSpPr>
+          <p:nvPr>
+            <p:ph idx="1"/>
+          </p:nvPr>
+        </p:nvSpPr>
+        <p:spPr>
+          <a:xfrm>
+            <a:off x="457200" y="760066"/>
+            <a:ext cx="8229600" cy="5414088"/>
+          </a:xfrm>
+        </p:spPr>
+        <p:txBody>
+          <a:bodyPr/>
+          <a:lstStyle/>
+          <a:p>
+            <a:r>
+              <a:rPr lang="en-US" dirty="0" smtClean="0"/>
+              <a:t>Python has:</a:t>
+            </a:r>
+          </a:p>
+          <a:p>
+            <a:pPr lvl="1"/>
+            <a:r>
+              <a:rPr lang="en-US" dirty="0" smtClean="0"/>
+              <a:t>Indentation</a:t>
+            </a:r>
+          </a:p>
+          <a:p>
+            <a:pPr lvl="1"/>
+            <a:r>
+              <a:rPr lang="en-US" dirty="0" smtClean="0"/>
+              <a:t>Modules</a:t>
+            </a:r>
+          </a:p>
+          <a:p>
+            <a:pPr lvl="1"/>
+            <a:r>
+              <a:rPr lang="en-US" dirty="0" smtClean="0"/>
+              <a:t>Rules for capturing typos; reading an undefined variable.</a:t>
+            </a:r>
+          </a:p>
+          <a:p>
+            <a:pPr lvl="1"/>
+            <a:r>
+              <a:rPr lang="en-US" dirty="0" smtClean="0"/>
+              <a:t>Orthogonal syntax</a:t>
+            </a:r>
+          </a:p>
+          <a:p>
+            <a:pPr lvl="1"/>
+            <a:r>
+              <a:rPr lang="en-US" dirty="0" smtClean="0"/>
+              <a:t>Almost all objects are references, explicitly use deep copy</a:t>
+            </a:r>
+          </a:p>
+          <a:p>
+            <a:pPr lvl="1"/>
+            <a:r>
+              <a:rPr lang="en-US" dirty="0" smtClean="0"/>
+              <a:t>Structured exception handling. In PHP5 but most standard functions still don</a:t>
+            </a:r>
+            <a:r>
+              <a:rPr lang="fr-FR" dirty="0" smtClean="0"/>
+              <a:t>’</a:t>
+            </a:r>
+            <a:r>
+              <a:rPr lang="en-US" dirty="0" smtClean="0"/>
+              <a:t>t use exceptions.</a:t>
+            </a:r>
+            <a:endParaRPr lang="en-US" dirty="0"/>
+          </a:p>
+        </p:txBody>
+      </p:sp>
+    </p:spTree>
+    <p:extLst>
+      <p:ext uri="{BB962C8B-B14F-4D97-AF65-F5344CB8AC3E}">
+        <p14:creationId xmlns:p14="http://schemas.microsoft.com/office/powerpoint/2010/main" val="3337393070"/>
+      </p:ext>
+    </p:extLst>
+  </p:cSld>
+  <p:clrMapOvr>
+    <a:masterClrMapping/>
+  </p:clrMapOvr>
+</p:sld>
+</file>
+
+<file path=ppt/slides/slide14.xml><?xml version="1.0" encoding="utf-8"?>
+<p:sld xmlns:a="http://schemas.openxmlformats.org/drawingml/2006/main" xmlns:r="http://schemas.openxmlformats.org/officeDocument/2006/relationships" xmlns:p="http://schemas.openxmlformats.org/presentationml/2006/main">
+  <p:cSld>
+    <p:spTree>
+      <p:nvGrpSpPr>
+        <p:cNvPr id="1" name=""/>
+        <p:cNvGrpSpPr/>
+        <p:nvPr/>
+      </p:nvGrpSpPr>
+      <p:grpSpPr>
+        <a:xfrm>
+          <a:off x="0" y="0"/>
+          <a:ext cx="0" cy="0"/>
+          <a:chOff x="0" y="0"/>
+          <a:chExt cx="0" cy="0"/>
+        </a:xfrm>
+      </p:grpSpPr>
+      <p:sp>
+        <p:nvSpPr>
+          <p:cNvPr id="3" name="Content Placeholder 2"/>
+          <p:cNvSpPr>
+            <a:spLocks noGrp="1"/>
+          </p:cNvSpPr>
+          <p:nvPr>
+            <p:ph idx="1"/>
+          </p:nvPr>
+        </p:nvSpPr>
+        <p:spPr>
+          <a:xfrm>
+            <a:off x="457200" y="493138"/>
+            <a:ext cx="8229600" cy="5922636"/>
+          </a:xfrm>
+        </p:spPr>
+        <p:txBody>
+          <a:bodyPr/>
+          <a:lstStyle/>
+          <a:p>
+            <a:r>
+              <a:rPr lang="en-US" dirty="0" smtClean="0"/>
+              <a:t>Web development frameworks</a:t>
+            </a:r>
+          </a:p>
+          <a:p>
+            <a:pPr lvl="1"/>
+            <a:r>
+              <a:rPr lang="en-US" dirty="0" smtClean="0"/>
+              <a:t>Web development built into the core framework for </a:t>
+            </a:r>
+            <a:r>
+              <a:rPr lang="en-US" dirty="0" err="1" smtClean="0"/>
+              <a:t>php</a:t>
+            </a:r>
+            <a:endParaRPr lang="en-US" dirty="0" smtClean="0"/>
+          </a:p>
+          <a:p>
+            <a:pPr lvl="1"/>
+            <a:r>
+              <a:rPr lang="en-US" dirty="0" smtClean="0"/>
+              <a:t>Python as add-on libraries and hence flexibility.</a:t>
+            </a:r>
+          </a:p>
+          <a:p>
+            <a:pPr lvl="1"/>
+            <a:r>
+              <a:rPr lang="en-US" dirty="0" smtClean="0"/>
+              <a:t>Too many choices can be bewildering, quick to get started with </a:t>
+            </a:r>
+            <a:r>
+              <a:rPr lang="en-US" dirty="0" err="1" smtClean="0"/>
+              <a:t>php</a:t>
+            </a:r>
+            <a:r>
+              <a:rPr lang="en-US" dirty="0" smtClean="0"/>
+              <a:t>. </a:t>
+            </a:r>
+          </a:p>
+          <a:p>
+            <a:pPr lvl="1"/>
+            <a:endParaRPr lang="en-US" dirty="0" smtClean="0"/>
+          </a:p>
+          <a:p>
+            <a:pPr lvl="1"/>
+            <a:endParaRPr lang="en-US" dirty="0" smtClean="0"/>
+          </a:p>
+          <a:p>
+            <a:pPr lvl="1"/>
+            <a:endParaRPr lang="en-US" dirty="0" smtClean="0"/>
+          </a:p>
+          <a:p>
+            <a:pPr lvl="1"/>
+            <a:endParaRPr lang="en-US" dirty="0"/>
+          </a:p>
+        </p:txBody>
+      </p:sp>
+    </p:spTree>
+    <p:extLst>
+      <p:ext uri="{BB962C8B-B14F-4D97-AF65-F5344CB8AC3E}">
+        <p14:creationId xmlns:p14="http://schemas.microsoft.com/office/powerpoint/2010/main" val="4043884096"/>
+      </p:ext>
+    </p:extLst>
+  </p:cSld>
+  <p:clrMapOvr>
+    <a:masterClrMapping/>
+  </p:clrMapOvr>
+</p:sld>
+</file>
+
+<file path=ppt/slides/slide15.xml><?xml version="1.0" encoding="utf-8"?>
+<p:sld xmlns:a="http://schemas.openxmlformats.org/drawingml/2006/main" xmlns:r="http://schemas.openxmlformats.org/officeDocument/2006/relationships" xmlns:p="http://schemas.openxmlformats.org/presentationml/2006/main">
+  <p:cSld>
+    <p:spTree>
+      <p:nvGrpSpPr>
+        <p:cNvPr id="1" name=""/>
+        <p:cNvGrpSpPr/>
+        <p:nvPr/>
+      </p:nvGrpSpPr>
+      <p:grpSpPr>
+        <a:xfrm>
+          <a:off x="0" y="0"/>
+          <a:ext cx="0" cy="0"/>
+          <a:chOff x="0" y="0"/>
+          <a:chExt cx="0" cy="0"/>
+        </a:xfrm>
+      </p:grpSpPr>
+      <p:sp>
+        <p:nvSpPr>
+          <p:cNvPr id="2" name="Title 1"/>
+          <p:cNvSpPr>
+            <a:spLocks noGrp="1"/>
+          </p:cNvSpPr>
+          <p:nvPr>
+            <p:ph type="title"/>
+          </p:nvPr>
+        </p:nvSpPr>
+        <p:spPr/>
+        <p:txBody>
+          <a:bodyPr/>
+          <a:lstStyle/>
+          <a:p>
+            <a:r>
+              <a:rPr lang="en-US" dirty="0" smtClean="0"/>
+              <a:t>Python </a:t>
+            </a:r>
+            <a:r>
+              <a:rPr lang="en-US" dirty="0" err="1" smtClean="0"/>
+              <a:t>vs</a:t>
+            </a:r>
+            <a:r>
+              <a:rPr lang="en-US" dirty="0" smtClean="0"/>
+              <a:t> Ruby</a:t>
+            </a:r>
+            <a:endParaRPr lang="en-US" dirty="0"/>
+          </a:p>
+        </p:txBody>
+      </p:sp>
+      <p:sp>
+        <p:nvSpPr>
+          <p:cNvPr id="3" name="Content Placeholder 2"/>
+          <p:cNvSpPr>
+            <a:spLocks noGrp="1"/>
+          </p:cNvSpPr>
+          <p:nvPr>
+            <p:ph idx="1"/>
+          </p:nvPr>
+        </p:nvSpPr>
+        <p:spPr>
+          <a:xfrm>
+            <a:off x="457200" y="1600199"/>
+            <a:ext cx="8229600" cy="4276923"/>
+          </a:xfrm>
+        </p:spPr>
+        <p:txBody>
+          <a:bodyPr>
+            <a:normAutofit/>
+          </a:bodyPr>
+          <a:lstStyle/>
+          <a:p>
+            <a:r>
+              <a:rPr lang="en-US" dirty="0" smtClean="0"/>
+              <a:t>High level, garbage collected, dynamic typing</a:t>
+            </a:r>
+          </a:p>
+          <a:p>
+            <a:r>
+              <a:rPr lang="en-US" i="1" dirty="0" smtClean="0"/>
+              <a:t>Ruby has greater depth in OO</a:t>
+            </a:r>
+          </a:p>
+          <a:p>
+            <a:r>
+              <a:rPr lang="en-US" dirty="0" smtClean="0"/>
+              <a:t>Fewer lines of code</a:t>
+            </a:r>
+          </a:p>
+          <a:p>
+            <a:r>
+              <a:rPr lang="en-US" dirty="0" smtClean="0"/>
+              <a:t>Lambda and blocks</a:t>
+            </a:r>
+          </a:p>
+          <a:p>
+            <a:r>
+              <a:rPr lang="en-US" dirty="0" smtClean="0"/>
+              <a:t>Rails</a:t>
+            </a:r>
+          </a:p>
+          <a:p>
+            <a:r>
+              <a:rPr lang="en-US" dirty="0" smtClean="0"/>
+              <a:t>Python has a much bigger community – a universe of modules.</a:t>
+            </a:r>
+          </a:p>
+          <a:p>
+            <a:endParaRPr lang="en-US" dirty="0" smtClean="0"/>
+          </a:p>
+          <a:p>
+            <a:endParaRPr lang="en-US" dirty="0"/>
+          </a:p>
+        </p:txBody>
+      </p:sp>
+    </p:spTree>
+    <p:extLst>
+      <p:ext uri="{BB962C8B-B14F-4D97-AF65-F5344CB8AC3E}">
+        <p14:creationId xmlns:p14="http://schemas.microsoft.com/office/powerpoint/2010/main" val="360446572"/>
+      </p:ext>
+    </p:extLst>
+  </p:cSld>
+  <p:clrMapOvr>
+    <a:masterClrMapping/>
+  </p:clrMapOvr>
+</p:sld>
+</file>
+
+<file path=ppt/slides/slide16.xml><?xml version="1.0" encoding="utf-8"?>
+<p:sld xmlns:a="http://schemas.openxmlformats.org/drawingml/2006/main" xmlns:r="http://schemas.openxmlformats.org/officeDocument/2006/relationships" xmlns:p="http://schemas.openxmlformats.org/presentationml/2006/main">
+  <p:cSld>
+    <p:spTree>
+      <p:nvGrpSpPr>
+        <p:cNvPr id="1" name=""/>
+        <p:cNvGrpSpPr/>
+        <p:nvPr/>
+      </p:nvGrpSpPr>
+      <p:grpSpPr>
+        <a:xfrm>
+          <a:off x="0" y="0"/>
+          <a:ext cx="0" cy="0"/>
+          <a:chOff x="0" y="0"/>
+          <a:chExt cx="0" cy="0"/>
+        </a:xfrm>
+      </p:grpSpPr>
+      <p:sp>
+        <p:nvSpPr>
+          <p:cNvPr id="2" name="Title 1"/>
+          <p:cNvSpPr>
+            <a:spLocks noGrp="1"/>
+          </p:cNvSpPr>
+          <p:nvPr>
+            <p:ph type="title"/>
+          </p:nvPr>
+        </p:nvSpPr>
+        <p:spPr/>
+        <p:txBody>
+          <a:bodyPr/>
+          <a:lstStyle/>
+          <a:p>
+            <a:r>
+              <a:rPr lang="en-US" dirty="0" smtClean="0"/>
+              <a:t>Sources</a:t>
+            </a:r>
+            <a:endParaRPr lang="en-US" dirty="0"/>
+          </a:p>
+        </p:txBody>
+      </p:sp>
+      <p:sp>
+        <p:nvSpPr>
+          <p:cNvPr id="3" name="Content Placeholder 2"/>
+          <p:cNvSpPr>
+            <a:spLocks noGrp="1"/>
+          </p:cNvSpPr>
+          <p:nvPr>
+            <p:ph idx="1"/>
+          </p:nvPr>
+        </p:nvSpPr>
+        <p:spPr>
+          <a:xfrm>
+            <a:off x="457200" y="1600201"/>
+            <a:ext cx="8229600" cy="3935040"/>
+          </a:xfrm>
+        </p:spPr>
+        <p:txBody>
+          <a:bodyPr>
+            <a:normAutofit fontScale="77500" lnSpcReduction="20000"/>
+          </a:bodyPr>
+          <a:lstStyle/>
+          <a:p>
+            <a:r>
+              <a:rPr lang="en-US" dirty="0"/>
+              <a:t>http://</a:t>
+            </a:r>
+            <a:r>
+              <a:rPr lang="en-US" dirty="0" err="1"/>
+              <a:t>www.python.org</a:t>
+            </a:r>
+            <a:r>
+              <a:rPr lang="en-US" dirty="0"/>
+              <a:t>/</a:t>
+            </a:r>
+          </a:p>
+          <a:p>
+            <a:r>
+              <a:rPr lang="en-US" dirty="0"/>
+              <a:t>http://</a:t>
+            </a:r>
+            <a:r>
+              <a:rPr lang="en-US" dirty="0" err="1"/>
+              <a:t>en.wikipedia.org</a:t>
+            </a:r>
+            <a:r>
+              <a:rPr lang="en-US" dirty="0"/>
+              <a:t>/wiki/Python_(</a:t>
+            </a:r>
+            <a:r>
+              <a:rPr lang="en-US" dirty="0" err="1"/>
+              <a:t>programming_language</a:t>
+            </a:r>
+            <a:r>
+              <a:rPr lang="en-US" dirty="0"/>
+              <a:t>)</a:t>
+            </a:r>
+          </a:p>
+          <a:p>
+            <a:r>
+              <a:rPr lang="en-US" dirty="0"/>
+              <a:t>http://</a:t>
+            </a:r>
+            <a:r>
+              <a:rPr lang="en-US" dirty="0" err="1"/>
+              <a:t>pythoncard.sourceforge.net</a:t>
+            </a:r>
+            <a:r>
+              <a:rPr lang="en-US" dirty="0"/>
+              <a:t>/</a:t>
+            </a:r>
+            <a:r>
+              <a:rPr lang="en-US" dirty="0" err="1"/>
+              <a:t>what_is_python.html</a:t>
+            </a:r>
+            <a:endParaRPr lang="en-US" dirty="0"/>
+          </a:p>
+          <a:p>
+            <a:r>
+              <a:rPr lang="en-US" dirty="0"/>
+              <a:t>http://</a:t>
+            </a:r>
+            <a:r>
+              <a:rPr lang="en-US" dirty="0" err="1"/>
+              <a:t>page.mi.fu-berlin.de</a:t>
+            </a:r>
+            <a:r>
+              <a:rPr lang="en-US" dirty="0"/>
+              <a:t>/</a:t>
+            </a:r>
+            <a:r>
+              <a:rPr lang="en-US" dirty="0" err="1"/>
+              <a:t>prechelt</a:t>
+            </a:r>
+            <a:r>
+              <a:rPr lang="en-US" dirty="0"/>
+              <a:t>/</a:t>
+            </a:r>
+            <a:r>
+              <a:rPr lang="en-US" dirty="0" err="1"/>
+              <a:t>Biblio</a:t>
+            </a:r>
+            <a:r>
+              <a:rPr lang="en-US" dirty="0"/>
+              <a:t>/</a:t>
+            </a:r>
+            <a:r>
+              <a:rPr lang="en-US" dirty="0" err="1"/>
+              <a:t>jccpprtTR.pdf</a:t>
+            </a:r>
+            <a:endParaRPr lang="en-US" dirty="0"/>
+          </a:p>
+          <a:p>
+            <a:r>
+              <a:rPr lang="en-US" dirty="0"/>
+              <a:t>http://</a:t>
+            </a:r>
+            <a:r>
+              <a:rPr lang="en-US" dirty="0" err="1"/>
+              <a:t>www.python.org</a:t>
+            </a:r>
+            <a:r>
+              <a:rPr lang="en-US" dirty="0"/>
+              <a:t>/doc/essays/</a:t>
+            </a:r>
+            <a:r>
+              <a:rPr lang="en-US" dirty="0" err="1"/>
+              <a:t>comparisons.html</a:t>
+            </a:r>
+            <a:endParaRPr lang="en-US" dirty="0"/>
+          </a:p>
+          <a:p>
+            <a:r>
+              <a:rPr lang="en-US" dirty="0"/>
+              <a:t>http://</a:t>
+            </a:r>
+            <a:r>
+              <a:rPr lang="en-US" dirty="0" err="1"/>
+              <a:t>wiki.python.org</a:t>
+            </a:r>
+            <a:r>
+              <a:rPr lang="en-US" dirty="0"/>
+              <a:t>/</a:t>
+            </a:r>
+            <a:r>
+              <a:rPr lang="en-US" dirty="0" err="1"/>
+              <a:t>moin</a:t>
+            </a:r>
+            <a:r>
+              <a:rPr lang="en-US" dirty="0"/>
+              <a:t>/</a:t>
+            </a:r>
+            <a:r>
+              <a:rPr lang="en-US" dirty="0" err="1"/>
+              <a:t>PythonVsPhp</a:t>
+            </a:r>
+            <a:endParaRPr lang="en-US" dirty="0"/>
+          </a:p>
+          <a:p>
+            <a:r>
+              <a:rPr lang="en-US" dirty="0"/>
+              <a:t>http://c2.com/</a:t>
+            </a:r>
+            <a:r>
+              <a:rPr lang="en-US" dirty="0" err="1"/>
+              <a:t>cgi</a:t>
+            </a:r>
+            <a:r>
+              <a:rPr lang="en-US" dirty="0"/>
+              <a:t>/</a:t>
+            </a:r>
+            <a:r>
+              <a:rPr lang="en-US" dirty="0" err="1"/>
+              <a:t>wiki?PythonVsRuby</a:t>
+            </a:r>
+            <a:endParaRPr lang="en-US" dirty="0"/>
+          </a:p>
+          <a:p>
+            <a:r>
+              <a:rPr lang="en-US" dirty="0"/>
+              <a:t>http://</a:t>
+            </a:r>
+            <a:r>
+              <a:rPr lang="en-US" dirty="0" err="1"/>
+              <a:t>www.udemy.com</a:t>
+            </a:r>
+            <a:r>
+              <a:rPr lang="en-US" dirty="0"/>
+              <a:t>/blog/modern-language-wars/</a:t>
+            </a:r>
+          </a:p>
+        </p:txBody>
+      </p:sp>
+    </p:spTree>
+    <p:extLst>
+      <p:ext uri="{BB962C8B-B14F-4D97-AF65-F5344CB8AC3E}">
+        <p14:creationId xmlns:p14="http://schemas.microsoft.com/office/powerpoint/2010/main" val="1602111367"/>
+      </p:ext>
+    </p:extLst>
+  </p:cSld>
+  <p:clrMapOvr>
+    <a:masterClrMapping/>
+  </p:clrMapOvr>
+</p:sld>
+</file>
+
 <file path=ppt/slides/slide2.xml><?xml version="1.0" encoding="utf-8"?>
 <p:sld xmlns:a="http://schemas.openxmlformats.org/drawingml/2006/main" xmlns:r="http://schemas.openxmlformats.org/officeDocument/2006/relationships" xmlns:p="http://schemas.openxmlformats.org/presentationml/2006/main">
   <p:cSld>
@@ -4111,8 +4963,8 @@
         </p:nvSpPr>
         <p:spPr>
           <a:xfrm>
-            <a:off x="457200" y="1715656"/>
-            <a:ext cx="8478982" cy="3687618"/>
+            <a:off x="457200" y="1530331"/>
+            <a:ext cx="8478982" cy="4428191"/>
           </a:xfrm>
         </p:spPr>
         <p:txBody>
@@ -4121,7 +4973,6 @@
           </a:bodyPr>
           <a:lstStyle/>
           <a:p>
-            <a:pPr lvl="1"/>
             <a:r>
               <a:rPr lang="en-US" dirty="0"/>
               <a:t>E</a:t>
@@ -4132,7 +4983,6 @@
             </a:r>
           </a:p>
           <a:p>
-            <a:pPr lvl="1"/>
             <a:r>
               <a:rPr lang="en-US" dirty="0"/>
               <a:t>H</a:t>
@@ -4143,7 +4993,6 @@
             </a:r>
           </a:p>
           <a:p>
-            <a:pPr lvl="1"/>
             <a:r>
               <a:rPr lang="en-US" dirty="0"/>
               <a:t>R</a:t>
@@ -4154,7 +5003,6 @@
             </a:r>
           </a:p>
           <a:p>
-            <a:pPr lvl="1"/>
             <a:r>
               <a:rPr lang="en-US" dirty="0"/>
               <a:t>P</a:t>
@@ -4165,7 +5013,6 @@
             </a:r>
           </a:p>
           <a:p>
-            <a:pPr lvl="1"/>
             <a:r>
               <a:rPr lang="en-US" dirty="0"/>
               <a:t>E</a:t>
@@ -4225,55 +5072,43 @@
         </p:nvSpPr>
         <p:spPr>
           <a:xfrm>
-            <a:off x="457200" y="1708728"/>
-            <a:ext cx="8229600" cy="3278908"/>
+            <a:off x="457200" y="1334971"/>
+            <a:ext cx="8229600" cy="4265390"/>
           </a:xfrm>
         </p:spPr>
         <p:txBody>
           <a:bodyPr/>
           <a:lstStyle/>
           <a:p>
-            <a:pPr lvl="1"/>
-            <a:r>
-              <a:rPr lang="en-US" dirty="0"/>
-              <a:t>E</a:t>
-            </a:r>
-            <a:r>
-              <a:rPr lang="en-US" dirty="0" smtClean="0"/>
-              <a:t>asily extensible</a:t>
-            </a:r>
-          </a:p>
-          <a:p>
-            <a:pPr lvl="1"/>
-            <a:r>
-              <a:rPr lang="en-US" dirty="0"/>
-              <a:t>O</a:t>
-            </a:r>
-            <a:r>
-              <a:rPr lang="en-US" dirty="0" smtClean="0"/>
-              <a:t>bject-oriented</a:t>
-            </a:r>
-          </a:p>
-          <a:p>
-            <a:pPr lvl="1"/>
+            <a:r>
+              <a:rPr lang="en-US" dirty="0" smtClean="0"/>
+              <a:t>Easily extensible</a:t>
+            </a:r>
+          </a:p>
+          <a:p>
+            <a:r>
+              <a:rPr lang="en-US" dirty="0" smtClean="0"/>
+              <a:t>Object-oriented</a:t>
+            </a:r>
+          </a:p>
+          <a:p>
             <a:r>
               <a:rPr lang="en-US" dirty="0" smtClean="0"/>
               <a:t>stable and mature</a:t>
             </a:r>
           </a:p>
           <a:p>
-            <a:pPr lvl="1"/>
             <a:r>
               <a:rPr lang="en-US" dirty="0" smtClean="0"/>
               <a:t>powerful standard libs</a:t>
             </a:r>
           </a:p>
           <a:p>
-            <a:pPr lvl="1"/>
             <a:r>
               <a:rPr lang="en-US" dirty="0" smtClean="0"/>
               <a:t>wealth of 3rd party packages</a:t>
             </a:r>
+            <a:endParaRPr lang="en-US" dirty="0" smtClean="0"/>
           </a:p>
         </p:txBody>
       </p:sp>
@@ -4374,7 +5209,23 @@
             <a:pPr lvl="1"/>
             <a:r>
               <a:rPr lang="en-US" dirty="0" smtClean="0"/>
-              <a:t>Not good for high-graphic 3d game that takes up a lot of CPU.</a:t>
+              <a:t>Not good for high-</a:t>
+            </a:r>
+            <a:r>
+              <a:rPr lang="en-US" dirty="0" smtClean="0"/>
+              <a:t>graphic, </a:t>
+            </a:r>
+            <a:r>
+              <a:rPr lang="en-US" dirty="0" smtClean="0"/>
+              <a:t>3d </a:t>
+            </a:r>
+            <a:r>
+              <a:rPr lang="en-US" dirty="0" smtClean="0"/>
+              <a:t>game programming </a:t>
+            </a:r>
+            <a:r>
+              <a:rPr lang="en-US" dirty="0" smtClean="0"/>
+              <a:t>that takes up a lot of CPU.</a:t>
             </a:r>
           </a:p>
           <a:p>

</xml_diff>